<commit_message>
Add outbound CRL arrows from Bridge and Float
</commit_message>
<xml_diff>
--- a/docs/source/resources/ha/BridgeDeploymentV4.pptx
+++ b/docs/source/resources/ha/BridgeDeploymentV4.pptx
@@ -8354,12 +8354,110 @@
           </a:fontRef>
         </p:style>
       </p:cxnSp>
-      <p:sp>
-        <p:nvSpPr>
-          <p:cNvPr id="100" name="TextBox 99">
-            <a:extLst>
-              <a:ext uri="{FF2B5EF4-FFF2-40B4-BE49-F238E27FC236}">
-                <a16:creationId xmlns:a16="http://schemas.microsoft.com/office/drawing/2014/main" id="{D68F45C3-25B2-483A-8917-A84A15F9A907}"/>
+      <p:cxnSp>
+        <p:nvCxnSpPr>
+          <p:cNvPr id="17" name="Straight Arrow Connector 16">
+            <a:extLst>
+              <a:ext uri="{FF2B5EF4-FFF2-40B4-BE49-F238E27FC236}">
+                <a16:creationId xmlns:a16="http://schemas.microsoft.com/office/drawing/2014/main" id="{FAE91B7E-C92B-41D3-9113-903D14C819B6}"/>
+              </a:ext>
+            </a:extLst>
+          </p:cNvPr>
+          <p:cNvCxnSpPr>
+            <a:cxnSpLocks/>
+          </p:cNvCxnSpPr>
+          <p:nvPr/>
+        </p:nvCxnSpPr>
+        <p:spPr>
+          <a:xfrm flipV="1">
+            <a:off x="4592951" y="1090933"/>
+            <a:ext cx="7050770" cy="504556"/>
+          </a:xfrm>
+          <a:prstGeom prst="bentConnector3">
+            <a:avLst>
+              <a:gd name="adj1" fmla="val 30115"/>
+            </a:avLst>
+          </a:prstGeom>
+          <a:ln w="25400">
+            <a:solidFill>
+              <a:schemeClr val="accent2">
+                <a:lumMod val="75000"/>
+              </a:schemeClr>
+            </a:solidFill>
+            <a:headEnd type="none" w="med" len="lg"/>
+            <a:tailEnd type="triangle" w="med" len="lg"/>
+          </a:ln>
+        </p:spPr>
+        <p:style>
+          <a:lnRef idx="1">
+            <a:schemeClr val="accent1"/>
+          </a:lnRef>
+          <a:fillRef idx="0">
+            <a:schemeClr val="accent1"/>
+          </a:fillRef>
+          <a:effectRef idx="0">
+            <a:schemeClr val="accent1"/>
+          </a:effectRef>
+          <a:fontRef idx="minor">
+            <a:schemeClr val="tx1"/>
+          </a:fontRef>
+        </p:style>
+      </p:cxnSp>
+      <p:cxnSp>
+        <p:nvCxnSpPr>
+          <p:cNvPr id="68" name="Straight Arrow Connector 16">
+            <a:extLst>
+              <a:ext uri="{FF2B5EF4-FFF2-40B4-BE49-F238E27FC236}">
+                <a16:creationId xmlns:a16="http://schemas.microsoft.com/office/drawing/2014/main" id="{415E1339-D75B-4647-B5AE-8808E41C534D}"/>
+              </a:ext>
+            </a:extLst>
+          </p:cNvPr>
+          <p:cNvCxnSpPr>
+            <a:cxnSpLocks/>
+          </p:cNvCxnSpPr>
+          <p:nvPr/>
+        </p:nvCxnSpPr>
+        <p:spPr>
+          <a:xfrm>
+            <a:off x="4592951" y="5317525"/>
+            <a:ext cx="7050770" cy="757353"/>
+          </a:xfrm>
+          <a:prstGeom prst="bentConnector3">
+            <a:avLst>
+              <a:gd name="adj1" fmla="val 28509"/>
+            </a:avLst>
+          </a:prstGeom>
+          <a:ln w="25400">
+            <a:solidFill>
+              <a:schemeClr val="accent2">
+                <a:lumMod val="75000"/>
+              </a:schemeClr>
+            </a:solidFill>
+            <a:headEnd type="none" w="med" len="lg"/>
+            <a:tailEnd type="triangle" w="med" len="lg"/>
+          </a:ln>
+        </p:spPr>
+        <p:style>
+          <a:lnRef idx="1">
+            <a:schemeClr val="accent1"/>
+          </a:lnRef>
+          <a:fillRef idx="0">
+            <a:schemeClr val="accent1"/>
+          </a:fillRef>
+          <a:effectRef idx="0">
+            <a:schemeClr val="accent1"/>
+          </a:effectRef>
+          <a:fontRef idx="minor">
+            <a:schemeClr val="tx1"/>
+          </a:fontRef>
+        </p:style>
+      </p:cxnSp>
+      <p:sp>
+        <p:nvSpPr>
+          <p:cNvPr id="73" name="TextBox 72">
+            <a:extLst>
+              <a:ext uri="{FF2B5EF4-FFF2-40B4-BE49-F238E27FC236}">
+                <a16:creationId xmlns:a16="http://schemas.microsoft.com/office/drawing/2014/main" id="{DE66B005-91B0-4855-9C28-5DDFDF4F4C59}"/>
               </a:ext>
             </a:extLst>
           </p:cNvPr>
@@ -8368,7 +8466,140 @@
         </p:nvSpPr>
         <p:spPr>
           <a:xfrm>
-            <a:off x="10232610" y="3832586"/>
+            <a:off x="10212499" y="1137580"/>
+            <a:ext cx="1677703" cy="307777"/>
+          </a:xfrm>
+          <a:prstGeom prst="rect">
+            <a:avLst/>
+          </a:prstGeom>
+          <a:noFill/>
+        </p:spPr>
+        <p:txBody>
+          <a:bodyPr wrap="none" rtlCol="0">
+            <a:spAutoFit/>
+          </a:bodyPr>
+          <a:lstStyle/>
+          <a:p>
+            <a:r>
+              <a:rPr lang="en-GB" sz="1400" dirty="0"/>
+              <a:t>Outbound CRL Fetch</a:t>
+            </a:r>
+          </a:p>
+        </p:txBody>
+      </p:sp>
+      <p:cxnSp>
+        <p:nvCxnSpPr>
+          <p:cNvPr id="75" name="Straight Arrow Connector 16">
+            <a:extLst>
+              <a:ext uri="{FF2B5EF4-FFF2-40B4-BE49-F238E27FC236}">
+                <a16:creationId xmlns:a16="http://schemas.microsoft.com/office/drawing/2014/main" id="{D5FFA167-CFD6-46CE-B652-CEFECAE75B95}"/>
+              </a:ext>
+            </a:extLst>
+          </p:cNvPr>
+          <p:cNvCxnSpPr>
+            <a:cxnSpLocks/>
+          </p:cNvCxnSpPr>
+          <p:nvPr/>
+        </p:nvCxnSpPr>
+        <p:spPr>
+          <a:xfrm flipV="1">
+            <a:off x="9284498" y="1489319"/>
+            <a:ext cx="2480029" cy="1"/>
+          </a:xfrm>
+          <a:prstGeom prst="bentConnector3">
+            <a:avLst>
+              <a:gd name="adj1" fmla="val 50000"/>
+            </a:avLst>
+          </a:prstGeom>
+          <a:ln w="25400">
+            <a:solidFill>
+              <a:schemeClr val="accent2">
+                <a:lumMod val="75000"/>
+              </a:schemeClr>
+            </a:solidFill>
+            <a:headEnd type="none" w="med" len="lg"/>
+            <a:tailEnd type="triangle" w="med" len="lg"/>
+          </a:ln>
+        </p:spPr>
+        <p:style>
+          <a:lnRef idx="1">
+            <a:schemeClr val="accent1"/>
+          </a:lnRef>
+          <a:fillRef idx="0">
+            <a:schemeClr val="accent1"/>
+          </a:fillRef>
+          <a:effectRef idx="0">
+            <a:schemeClr val="accent1"/>
+          </a:effectRef>
+          <a:fontRef idx="minor">
+            <a:schemeClr val="tx1"/>
+          </a:fontRef>
+        </p:style>
+      </p:cxnSp>
+      <p:cxnSp>
+        <p:nvCxnSpPr>
+          <p:cNvPr id="77" name="Straight Arrow Connector 16">
+            <a:extLst>
+              <a:ext uri="{FF2B5EF4-FFF2-40B4-BE49-F238E27FC236}">
+                <a16:creationId xmlns:a16="http://schemas.microsoft.com/office/drawing/2014/main" id="{810F2F48-C805-4F73-92F8-6E68F3B1EF24}"/>
+              </a:ext>
+            </a:extLst>
+          </p:cNvPr>
+          <p:cNvCxnSpPr>
+            <a:cxnSpLocks/>
+          </p:cNvCxnSpPr>
+          <p:nvPr/>
+        </p:nvCxnSpPr>
+        <p:spPr>
+          <a:xfrm flipV="1">
+            <a:off x="9078813" y="5631166"/>
+            <a:ext cx="2571289" cy="1"/>
+          </a:xfrm>
+          <a:prstGeom prst="bentConnector3">
+            <a:avLst>
+              <a:gd name="adj1" fmla="val 50000"/>
+            </a:avLst>
+          </a:prstGeom>
+          <a:ln w="25400">
+            <a:solidFill>
+              <a:schemeClr val="accent2">
+                <a:lumMod val="75000"/>
+              </a:schemeClr>
+            </a:solidFill>
+            <a:headEnd type="none" w="med" len="lg"/>
+            <a:tailEnd type="triangle" w="med" len="lg"/>
+          </a:ln>
+        </p:spPr>
+        <p:style>
+          <a:lnRef idx="1">
+            <a:schemeClr val="accent1"/>
+          </a:lnRef>
+          <a:fillRef idx="0">
+            <a:schemeClr val="accent1"/>
+          </a:fillRef>
+          <a:effectRef idx="0">
+            <a:schemeClr val="accent1"/>
+          </a:effectRef>
+          <a:fontRef idx="minor">
+            <a:schemeClr val="tx1"/>
+          </a:fontRef>
+        </p:style>
+      </p:cxnSp>
+      <p:sp>
+        <p:nvSpPr>
+          <p:cNvPr id="81" name="TextBox 80">
+            <a:extLst>
+              <a:ext uri="{FF2B5EF4-FFF2-40B4-BE49-F238E27FC236}">
+                <a16:creationId xmlns:a16="http://schemas.microsoft.com/office/drawing/2014/main" id="{DF692459-8026-407C-86FF-32E5A5C32A0C}"/>
+              </a:ext>
+            </a:extLst>
+          </p:cNvPr>
+          <p:cNvSpPr txBox="1"/>
+          <p:nvPr/>
+        </p:nvSpPr>
+        <p:spPr>
+          <a:xfrm>
+            <a:off x="10207109" y="5696201"/>
             <a:ext cx="1677703" cy="307777"/>
           </a:xfrm>
           <a:prstGeom prst="rect">
@@ -10006,15 +10237,22 @@
           <a:p>
             <a:pPr algn="ctr"/>
             <a:r>
-              <a:rPr lang="en-GB" dirty="0">
+              <a:rPr lang="en-GB" dirty="0" err="1">
                 <a:solidFill>
                   <a:schemeClr val="bg1">
                     <a:lumMod val="95000"/>
                   </a:schemeClr>
                 </a:solidFill>
               </a:rPr>
-              <a:t>Infra</a:t>
-            </a:r>
+              <a:t>vmInfra</a:t>
+            </a:r>
+            <a:endParaRPr lang="en-GB" dirty="0">
+              <a:solidFill>
+                <a:schemeClr val="bg1">
+                  <a:lumMod val="95000"/>
+                </a:schemeClr>
+              </a:solidFill>
+            </a:endParaRPr>
           </a:p>
         </p:txBody>
       </p:sp>

</xml_diff>